<commit_message>
range elevation and coordinate system working, azimuth not
</commit_message>
<xml_diff>
--- a/Simulation Display Design v2.pptx
+++ b/Simulation Display Design v2.pptx
@@ -262,7 +262,7 @@
           <a:p>
             <a:fld id="{A6436E86-AA61-2348-A215-07D103EB6A07}" type="datetimeFigureOut">
               <a:rPr lang="en-US" smtClean="0"/>
-              <a:t>2/5/23</a:t>
+              <a:t>2/7/23</a:t>
             </a:fld>
             <a:endParaRPr lang="en-US"/>
           </a:p>
@@ -460,7 +460,7 @@
           <a:p>
             <a:fld id="{A6436E86-AA61-2348-A215-07D103EB6A07}" type="datetimeFigureOut">
               <a:rPr lang="en-US" smtClean="0"/>
-              <a:t>2/5/23</a:t>
+              <a:t>2/7/23</a:t>
             </a:fld>
             <a:endParaRPr lang="en-US"/>
           </a:p>
@@ -668,7 +668,7 @@
           <a:p>
             <a:fld id="{A6436E86-AA61-2348-A215-07D103EB6A07}" type="datetimeFigureOut">
               <a:rPr lang="en-US" smtClean="0"/>
-              <a:t>2/5/23</a:t>
+              <a:t>2/7/23</a:t>
             </a:fld>
             <a:endParaRPr lang="en-US"/>
           </a:p>
@@ -866,7 +866,7 @@
           <a:p>
             <a:fld id="{A6436E86-AA61-2348-A215-07D103EB6A07}" type="datetimeFigureOut">
               <a:rPr lang="en-US" smtClean="0"/>
-              <a:t>2/5/23</a:t>
+              <a:t>2/7/23</a:t>
             </a:fld>
             <a:endParaRPr lang="en-US"/>
           </a:p>
@@ -1141,7 +1141,7 @@
           <a:p>
             <a:fld id="{A6436E86-AA61-2348-A215-07D103EB6A07}" type="datetimeFigureOut">
               <a:rPr lang="en-US" smtClean="0"/>
-              <a:t>2/5/23</a:t>
+              <a:t>2/7/23</a:t>
             </a:fld>
             <a:endParaRPr lang="en-US"/>
           </a:p>
@@ -1406,7 +1406,7 @@
           <a:p>
             <a:fld id="{A6436E86-AA61-2348-A215-07D103EB6A07}" type="datetimeFigureOut">
               <a:rPr lang="en-US" smtClean="0"/>
-              <a:t>2/5/23</a:t>
+              <a:t>2/7/23</a:t>
             </a:fld>
             <a:endParaRPr lang="en-US"/>
           </a:p>
@@ -1818,7 +1818,7 @@
           <a:p>
             <a:fld id="{A6436E86-AA61-2348-A215-07D103EB6A07}" type="datetimeFigureOut">
               <a:rPr lang="en-US" smtClean="0"/>
-              <a:t>2/5/23</a:t>
+              <a:t>2/7/23</a:t>
             </a:fld>
             <a:endParaRPr lang="en-US"/>
           </a:p>
@@ -1959,7 +1959,7 @@
           <a:p>
             <a:fld id="{A6436E86-AA61-2348-A215-07D103EB6A07}" type="datetimeFigureOut">
               <a:rPr lang="en-US" smtClean="0"/>
-              <a:t>2/5/23</a:t>
+              <a:t>2/7/23</a:t>
             </a:fld>
             <a:endParaRPr lang="en-US"/>
           </a:p>
@@ -2072,7 +2072,7 @@
           <a:p>
             <a:fld id="{A6436E86-AA61-2348-A215-07D103EB6A07}" type="datetimeFigureOut">
               <a:rPr lang="en-US" smtClean="0"/>
-              <a:t>2/5/23</a:t>
+              <a:t>2/7/23</a:t>
             </a:fld>
             <a:endParaRPr lang="en-US"/>
           </a:p>
@@ -2383,7 +2383,7 @@
           <a:p>
             <a:fld id="{A6436E86-AA61-2348-A215-07D103EB6A07}" type="datetimeFigureOut">
               <a:rPr lang="en-US" smtClean="0"/>
-              <a:t>2/5/23</a:t>
+              <a:t>2/7/23</a:t>
             </a:fld>
             <a:endParaRPr lang="en-US"/>
           </a:p>
@@ -2671,7 +2671,7 @@
           <a:p>
             <a:fld id="{A6436E86-AA61-2348-A215-07D103EB6A07}" type="datetimeFigureOut">
               <a:rPr lang="en-US" smtClean="0"/>
-              <a:t>2/5/23</a:t>
+              <a:t>2/7/23</a:t>
             </a:fld>
             <a:endParaRPr lang="en-US"/>
           </a:p>
@@ -2912,7 +2912,7 @@
           <a:p>
             <a:fld id="{A6436E86-AA61-2348-A215-07D103EB6A07}" type="datetimeFigureOut">
               <a:rPr lang="en-US" smtClean="0"/>
-              <a:t>2/5/23</a:t>
+              <a:t>2/7/23</a:t>
             </a:fld>
             <a:endParaRPr lang="en-US"/>
           </a:p>
@@ -5942,11 +5942,172 @@
           </a:xfrm>
         </p:spPr>
         <p:txBody>
-          <a:bodyPr/>
-          <a:lstStyle/>
+          <a:bodyPr>
+            <a:normAutofit/>
+          </a:bodyPr>
+          <a:lstStyle/>
+          <a:p>
+            <a:pPr algn="l" fontAlgn="base"/>
+            <a:r>
+              <a:rPr lang="en-US" sz="1600" b="0" i="0" dirty="0">
+                <a:solidFill>
+                  <a:srgbClr val="232629"/>
+                </a:solidFill>
+                <a:effectLst/>
+                <a:hlinkClick r:id="rId2"/>
+              </a:rPr>
+              <a:t>https://stackoverflow.com/questions/1185408/converting-from-longitude-latitude-to-cartesian-coordinates</a:t>
+            </a:r>
+            <a:endParaRPr lang="en-US" sz="1600" b="0" i="0" dirty="0">
+              <a:solidFill>
+                <a:srgbClr val="232629"/>
+              </a:solidFill>
+              <a:effectLst/>
+            </a:endParaRPr>
+          </a:p>
+          <a:p>
+            <a:pPr algn="l" fontAlgn="base"/>
+            <a:endParaRPr lang="en-US" sz="1600" b="0" i="0" dirty="0">
+              <a:solidFill>
+                <a:srgbClr val="232629"/>
+              </a:solidFill>
+              <a:effectLst/>
+            </a:endParaRPr>
+          </a:p>
+          <a:p>
+            <a:pPr algn="l" fontAlgn="base"/>
+            <a:r>
+              <a:rPr lang="en-US" sz="1600" dirty="0">
+                <a:solidFill>
+                  <a:srgbClr val="232629"/>
+                </a:solidFill>
+              </a:rPr>
+              <a:t>SMAD section 5-1 Eq 5-1</a:t>
+            </a:r>
+          </a:p>
+          <a:p>
+            <a:pPr algn="l" fontAlgn="base"/>
+            <a:r>
+              <a:rPr lang="en-US" sz="1600" b="0" i="0" dirty="0">
+                <a:solidFill>
+                  <a:srgbClr val="232629"/>
+                </a:solidFill>
+                <a:effectLst/>
+              </a:rPr>
+              <a:t>the x-axis goes through </a:t>
+            </a:r>
+            <a:r>
+              <a:rPr lang="en-US" sz="1600" b="0" i="0" dirty="0" err="1">
+                <a:solidFill>
+                  <a:srgbClr val="232629"/>
+                </a:solidFill>
+                <a:effectLst/>
+              </a:rPr>
+              <a:t>long,lat</a:t>
+            </a:r>
+            <a:r>
+              <a:rPr lang="en-US" sz="1600" b="0" i="0" dirty="0">
+                <a:solidFill>
+                  <a:srgbClr val="232629"/>
+                </a:solidFill>
+                <a:effectLst/>
+              </a:rPr>
+              <a:t> (0,0), so longitude 0 meets the equator;</a:t>
+            </a:r>
+          </a:p>
+          <a:p>
+            <a:pPr algn="l" fontAlgn="base"/>
+            <a:r>
+              <a:rPr lang="en-US" sz="1600" b="0" i="0" dirty="0">
+                <a:solidFill>
+                  <a:srgbClr val="232629"/>
+                </a:solidFill>
+                <a:effectLst/>
+              </a:rPr>
+              <a:t>the y-axis goes through (0,90);</a:t>
+            </a:r>
+          </a:p>
+          <a:p>
+            <a:pPr algn="l" fontAlgn="base"/>
+            <a:r>
+              <a:rPr lang="en-US" sz="1600" b="0" i="0" dirty="0">
+                <a:solidFill>
+                  <a:srgbClr val="232629"/>
+                </a:solidFill>
+                <a:effectLst/>
+              </a:rPr>
+              <a:t>and the z-axis goes through the poles.</a:t>
+            </a:r>
+          </a:p>
           <a:p>
             <a:pPr algn="l"/>
-            <a:endParaRPr lang="en-US"/>
+            <a:endParaRPr lang="en-US" sz="1600" dirty="0"/>
+          </a:p>
+          <a:p>
+            <a:pPr algn="l"/>
+            <a:r>
+              <a:rPr lang="en-US" sz="1600" dirty="0"/>
+              <a:t>x = R * cos(</a:t>
+            </a:r>
+            <a:r>
+              <a:rPr lang="en-US" sz="1600" dirty="0" err="1"/>
+              <a:t>lat</a:t>
+            </a:r>
+            <a:r>
+              <a:rPr lang="en-US" sz="1600" dirty="0"/>
+              <a:t>) * cos(</a:t>
+            </a:r>
+            <a:r>
+              <a:rPr lang="en-US" sz="1600" dirty="0" err="1"/>
+              <a:t>lon</a:t>
+            </a:r>
+            <a:r>
+              <a:rPr lang="en-US" sz="1600" dirty="0"/>
+              <a:t>) </a:t>
+            </a:r>
+          </a:p>
+          <a:p>
+            <a:pPr algn="l"/>
+            <a:r>
+              <a:rPr lang="en-US" sz="1600" dirty="0"/>
+              <a:t>y = R * cos(</a:t>
+            </a:r>
+            <a:r>
+              <a:rPr lang="en-US" sz="1600" dirty="0" err="1"/>
+              <a:t>lat</a:t>
+            </a:r>
+            <a:r>
+              <a:rPr lang="en-US" sz="1600" dirty="0"/>
+              <a:t>) * sin(</a:t>
+            </a:r>
+            <a:r>
+              <a:rPr lang="en-US" sz="1600" dirty="0" err="1"/>
+              <a:t>lon</a:t>
+            </a:r>
+            <a:r>
+              <a:rPr lang="en-US" sz="1600" dirty="0"/>
+              <a:t>) </a:t>
+            </a:r>
+          </a:p>
+          <a:p>
+            <a:pPr algn="l"/>
+            <a:r>
+              <a:rPr lang="en-US" sz="1600" dirty="0"/>
+              <a:t>z = R *sin(</a:t>
+            </a:r>
+            <a:r>
+              <a:rPr lang="en-US" sz="1600" dirty="0" err="1"/>
+              <a:t>lat</a:t>
+            </a:r>
+            <a:r>
+              <a:rPr lang="en-US" sz="1600" dirty="0"/>
+              <a:t>)</a:t>
+            </a:r>
+            <a:endParaRPr lang="en-US" sz="1600" dirty="0">
+              <a:solidFill>
+                <a:schemeClr val="accent1"/>
+              </a:solidFill>
+            </a:endParaRPr>
           </a:p>
         </p:txBody>
       </p:sp>
@@ -5965,7 +6126,7 @@
           <p:nvPr/>
         </p:nvPicPr>
         <p:blipFill>
-          <a:blip r:embed="rId2"/>
+          <a:blip r:embed="rId3"/>
           <a:stretch>
             <a:fillRect/>
           </a:stretch>
@@ -5974,6 +6135,66 @@
           <a:xfrm>
             <a:off x="0" y="0"/>
             <a:ext cx="6983041" cy="6858000"/>
+          </a:xfrm>
+          <a:prstGeom prst="rect">
+            <a:avLst/>
+          </a:prstGeom>
+        </p:spPr>
+      </p:pic>
+      <p:pic>
+        <p:nvPicPr>
+          <p:cNvPr id="5" name="Picture 4" descr="Text, letter&#10;&#10;Description automatically generated">
+            <a:extLst>
+              <a:ext uri="{FF2B5EF4-FFF2-40B4-BE49-F238E27FC236}">
+                <a16:creationId xmlns:a16="http://schemas.microsoft.com/office/drawing/2014/main" id="{4261D98A-B49A-7C81-4A96-26BCE46703B9}"/>
+              </a:ext>
+            </a:extLst>
+          </p:cNvPr>
+          <p:cNvPicPr>
+            <a:picLocks noChangeAspect="1"/>
+          </p:cNvPicPr>
+          <p:nvPr/>
+        </p:nvPicPr>
+        <p:blipFill>
+          <a:blip r:embed="rId4"/>
+          <a:stretch>
+            <a:fillRect/>
+          </a:stretch>
+        </p:blipFill>
+        <p:spPr>
+          <a:xfrm>
+            <a:off x="9715759" y="2561230"/>
+            <a:ext cx="2133861" cy="1735540"/>
+          </a:xfrm>
+          <a:prstGeom prst="rect">
+            <a:avLst/>
+          </a:prstGeom>
+        </p:spPr>
+      </p:pic>
+      <p:pic>
+        <p:nvPicPr>
+          <p:cNvPr id="6" name="Picture 5">
+            <a:extLst>
+              <a:ext uri="{FF2B5EF4-FFF2-40B4-BE49-F238E27FC236}">
+                <a16:creationId xmlns:a16="http://schemas.microsoft.com/office/drawing/2014/main" id="{A35406A9-CD57-CB0D-C176-8B6AA217B538}"/>
+              </a:ext>
+            </a:extLst>
+          </p:cNvPr>
+          <p:cNvPicPr>
+            <a:picLocks noChangeAspect="1"/>
+          </p:cNvPicPr>
+          <p:nvPr/>
+        </p:nvPicPr>
+        <p:blipFill>
+          <a:blip r:embed="rId5"/>
+          <a:stretch>
+            <a:fillRect/>
+          </a:stretch>
+        </p:blipFill>
+        <p:spPr>
+          <a:xfrm>
+            <a:off x="9715759" y="4495846"/>
+            <a:ext cx="1745556" cy="1181607"/>
           </a:xfrm>
           <a:prstGeom prst="rect">
             <a:avLst/>
@@ -6178,7 +6399,10 @@
           <a:bodyPr/>
           <a:lstStyle/>
           <a:p>
-            <a:endParaRPr lang="en-US"/>
+            <a:r>
+              <a:rPr lang="en-US" dirty="0"/>
+              <a:t>Mission Concepts</a:t>
+            </a:r>
           </a:p>
         </p:txBody>
       </p:sp>
@@ -6201,15 +6425,9 @@
         <p:spPr/>
         <p:txBody>
           <a:bodyPr>
-            <a:normAutofit fontScale="47500" lnSpcReduction="20000"/>
+            <a:normAutofit fontScale="55000" lnSpcReduction="20000"/>
           </a:bodyPr>
           <a:lstStyle/>
-          <a:p>
-            <a:r>
-              <a:rPr lang="en-US" dirty="0"/>
-              <a:t>Mission Concepts</a:t>
-            </a:r>
-          </a:p>
           <a:p>
             <a:endParaRPr lang="en-US" dirty="0"/>
           </a:p>
@@ -6330,12 +6548,12 @@
           </a:p>
           <a:p>
             <a:r>
-              <a:rPr lang="en-US"/>
+              <a:rPr lang="en-US" dirty="0"/>
               <a:t>	solar panel size</a:t>
             </a:r>
           </a:p>
           <a:p>
-            <a:endParaRPr lang="en-US"/>
+            <a:endParaRPr lang="en-US" dirty="0"/>
           </a:p>
         </p:txBody>
       </p:sp>

</xml_diff>